<commit_message>
Adam PowerPoint Slides Update 5th Slide
</commit_message>
<xml_diff>
--- a/AdamProject1/Adam Slides.pptx
+++ b/AdamProject1/Adam Slides.pptx
@@ -9,6 +9,7 @@
     <p:sldId id="266" r:id="rId3"/>
     <p:sldId id="267" r:id="rId4"/>
     <p:sldId id="268" r:id="rId5"/>
+    <p:sldId id="269" r:id="rId6"/>
   </p:sldIdLst>
   <p:sldSz cx="12192000" cy="6858000"/>
   <p:notesSz cx="6858000" cy="9144000"/>
@@ -6701,6 +6702,808 @@
 </p:sld>
 </file>
 
+<file path=ppt/slides/slide5.xml><?xml version="1.0" encoding="utf-8"?>
+<p:sld xmlns:a="http://schemas.openxmlformats.org/drawingml/2006/main" xmlns:r="http://schemas.openxmlformats.org/officeDocument/2006/relationships" xmlns:p="http://schemas.openxmlformats.org/presentationml/2006/main">
+  <p:cSld>
+    <p:bg>
+      <p:bgPr>
+        <a:solidFill>
+          <a:schemeClr val="bg1"/>
+        </a:solidFill>
+        <a:effectLst/>
+      </p:bgPr>
+    </p:bg>
+    <p:spTree>
+      <p:nvGrpSpPr>
+        <p:cNvPr id="1" name=""/>
+        <p:cNvGrpSpPr/>
+        <p:nvPr/>
+      </p:nvGrpSpPr>
+      <p:grpSpPr>
+        <a:xfrm>
+          <a:off x="0" y="0"/>
+          <a:ext cx="0" cy="0"/>
+          <a:chOff x="0" y="0"/>
+          <a:chExt cx="0" cy="0"/>
+        </a:xfrm>
+      </p:grpSpPr>
+      <p:grpSp>
+        <p:nvGrpSpPr>
+          <p:cNvPr id="10" name="Group 9"/>
+          <p:cNvGrpSpPr/>
+          <p:nvPr/>
+        </p:nvGrpSpPr>
+        <p:grpSpPr>
+          <a:xfrm>
+            <a:off x="10786456" y="5876365"/>
+            <a:ext cx="1433406" cy="885670"/>
+            <a:chOff x="3630701" y="2043953"/>
+            <a:chExt cx="1492523" cy="1076025"/>
+          </a:xfrm>
+        </p:grpSpPr>
+        <p:grpSp>
+          <p:nvGrpSpPr>
+            <p:cNvPr id="11" name="Group 10"/>
+            <p:cNvGrpSpPr/>
+            <p:nvPr/>
+          </p:nvGrpSpPr>
+          <p:grpSpPr>
+            <a:xfrm rot="1138481">
+              <a:off x="3799123" y="2043953"/>
+              <a:ext cx="1231118" cy="1076025"/>
+              <a:chOff x="249114" y="2872641"/>
+              <a:chExt cx="3949282" cy="2931195"/>
+            </a:xfrm>
+            <a:effectLst/>
+          </p:grpSpPr>
+          <p:pic>
+            <p:nvPicPr>
+              <p:cNvPr id="13" name="Picture 12"/>
+              <p:cNvPicPr>
+                <a:picLocks noChangeAspect="1"/>
+              </p:cNvPicPr>
+              <p:nvPr/>
+            </p:nvPicPr>
+            <p:blipFill>
+              <a:blip r:embed="rId2" cstate="print">
+                <a:clrChange>
+                  <a:clrFrom>
+                    <a:srgbClr val="FFFFFF"/>
+                  </a:clrFrom>
+                  <a:clrTo>
+                    <a:srgbClr val="FFFFFF">
+                      <a:alpha val="0"/>
+                    </a:srgbClr>
+                  </a:clrTo>
+                </a:clrChange>
+                <a:duotone>
+                  <a:prstClr val="black"/>
+                  <a:schemeClr val="accent1">
+                    <a:tint val="45000"/>
+                    <a:satMod val="400000"/>
+                  </a:schemeClr>
+                </a:duotone>
+                <a:extLst>
+                  <a:ext uri="{28A0092B-C50C-407E-A947-70E740481C1C}">
+                    <a14:useLocalDpi xmlns:a14="http://schemas.microsoft.com/office/drawing/2010/main" val="0"/>
+                  </a:ext>
+                </a:extLst>
+              </a:blip>
+              <a:stretch>
+                <a:fillRect/>
+              </a:stretch>
+            </p:blipFill>
+            <p:spPr>
+              <a:xfrm rot="4751443">
+                <a:off x="2055271" y="3039012"/>
+                <a:ext cx="2143125" cy="2143125"/>
+              </a:xfrm>
+              <a:prstGeom prst="rect">
+                <a:avLst/>
+              </a:prstGeom>
+            </p:spPr>
+          </p:pic>
+          <p:pic>
+            <p:nvPicPr>
+              <p:cNvPr id="14" name="Picture 13"/>
+              <p:cNvPicPr>
+                <a:picLocks noChangeAspect="1"/>
+              </p:cNvPicPr>
+              <p:nvPr/>
+            </p:nvPicPr>
+            <p:blipFill>
+              <a:blip r:embed="rId2" cstate="print">
+                <a:clrChange>
+                  <a:clrFrom>
+                    <a:srgbClr val="FFFFFF"/>
+                  </a:clrFrom>
+                  <a:clrTo>
+                    <a:srgbClr val="FFFFFF">
+                      <a:alpha val="0"/>
+                    </a:srgbClr>
+                  </a:clrTo>
+                </a:clrChange>
+                <a:duotone>
+                  <a:prstClr val="black"/>
+                  <a:schemeClr val="accent1">
+                    <a:tint val="45000"/>
+                    <a:satMod val="400000"/>
+                  </a:schemeClr>
+                </a:duotone>
+                <a:extLst>
+                  <a:ext uri="{28A0092B-C50C-407E-A947-70E740481C1C}">
+                    <a14:useLocalDpi xmlns:a14="http://schemas.microsoft.com/office/drawing/2010/main" val="0"/>
+                  </a:ext>
+                </a:extLst>
+              </a:blip>
+              <a:stretch>
+                <a:fillRect/>
+              </a:stretch>
+            </p:blipFill>
+            <p:spPr>
+              <a:xfrm rot="2710570">
+                <a:off x="1321640" y="2872641"/>
+                <a:ext cx="2143125" cy="2143125"/>
+              </a:xfrm>
+              <a:prstGeom prst="rect">
+                <a:avLst/>
+              </a:prstGeom>
+            </p:spPr>
+          </p:pic>
+          <p:pic>
+            <p:nvPicPr>
+              <p:cNvPr id="15" name="Picture 14"/>
+              <p:cNvPicPr>
+                <a:picLocks noChangeAspect="1"/>
+              </p:cNvPicPr>
+              <p:nvPr/>
+            </p:nvPicPr>
+            <p:blipFill>
+              <a:blip r:embed="rId2" cstate="print">
+                <a:clrChange>
+                  <a:clrFrom>
+                    <a:srgbClr val="FFFFFF"/>
+                  </a:clrFrom>
+                  <a:clrTo>
+                    <a:srgbClr val="FFFFFF">
+                      <a:alpha val="0"/>
+                    </a:srgbClr>
+                  </a:clrTo>
+                </a:clrChange>
+                <a:duotone>
+                  <a:prstClr val="black"/>
+                  <a:schemeClr val="accent1">
+                    <a:tint val="45000"/>
+                    <a:satMod val="400000"/>
+                  </a:schemeClr>
+                </a:duotone>
+                <a:extLst>
+                  <a:ext uri="{28A0092B-C50C-407E-A947-70E740481C1C}">
+                    <a14:useLocalDpi xmlns:a14="http://schemas.microsoft.com/office/drawing/2010/main" val="0"/>
+                  </a:ext>
+                </a:extLst>
+              </a:blip>
+              <a:stretch>
+                <a:fillRect/>
+              </a:stretch>
+            </p:blipFill>
+            <p:spPr>
+              <a:xfrm rot="657510">
+                <a:off x="633558" y="3196789"/>
+                <a:ext cx="2143125" cy="2143125"/>
+              </a:xfrm>
+              <a:prstGeom prst="rect">
+                <a:avLst/>
+              </a:prstGeom>
+            </p:spPr>
+          </p:pic>
+          <p:pic>
+            <p:nvPicPr>
+              <p:cNvPr id="16" name="Picture 15"/>
+              <p:cNvPicPr>
+                <a:picLocks noChangeAspect="1"/>
+              </p:cNvPicPr>
+              <p:nvPr/>
+            </p:nvPicPr>
+            <p:blipFill>
+              <a:blip r:embed="rId2" cstate="print">
+                <a:clrChange>
+                  <a:clrFrom>
+                    <a:srgbClr val="FFFFFF"/>
+                  </a:clrFrom>
+                  <a:clrTo>
+                    <a:srgbClr val="FFFFFF">
+                      <a:alpha val="0"/>
+                    </a:srgbClr>
+                  </a:clrTo>
+                </a:clrChange>
+                <a:duotone>
+                  <a:prstClr val="black"/>
+                  <a:schemeClr val="accent1">
+                    <a:tint val="45000"/>
+                    <a:satMod val="400000"/>
+                  </a:schemeClr>
+                </a:duotone>
+                <a:extLst>
+                  <a:ext uri="{28A0092B-C50C-407E-A947-70E740481C1C}">
+                    <a14:useLocalDpi xmlns:a14="http://schemas.microsoft.com/office/drawing/2010/main" val="0"/>
+                  </a:ext>
+                </a:extLst>
+              </a:blip>
+              <a:stretch>
+                <a:fillRect/>
+              </a:stretch>
+            </p:blipFill>
+            <p:spPr>
+              <a:xfrm rot="20624589">
+                <a:off x="249114" y="3660711"/>
+                <a:ext cx="2143125" cy="2143125"/>
+              </a:xfrm>
+              <a:prstGeom prst="rect">
+                <a:avLst/>
+              </a:prstGeom>
+            </p:spPr>
+          </p:pic>
+        </p:grpSp>
+        <p:sp>
+          <p:nvSpPr>
+            <p:cNvPr id="12" name="Rectangle 11"/>
+            <p:cNvSpPr/>
+            <p:nvPr/>
+          </p:nvSpPr>
+          <p:spPr>
+            <a:xfrm>
+              <a:off x="3630701" y="2463412"/>
+              <a:ext cx="1492523" cy="336534"/>
+            </a:xfrm>
+            <a:prstGeom prst="rect">
+              <a:avLst/>
+            </a:prstGeom>
+            <a:noFill/>
+          </p:spPr>
+          <p:txBody>
+            <a:bodyPr wrap="none" lIns="91440" tIns="45720" rIns="91440" bIns="45720">
+              <a:spAutoFit/>
+            </a:bodyPr>
+            <a:lstStyle/>
+            <a:p>
+              <a:pPr algn="ctr"/>
+              <a:r>
+                <a:rPr lang="en-BZ" sz="1200" b="1" cap="none" spc="50" dirty="0">
+                  <a:ln w="9525" cmpd="sng">
+                    <a:solidFill>
+                      <a:schemeClr val="accent1"/>
+                    </a:solidFill>
+                    <a:prstDash val="solid"/>
+                  </a:ln>
+                  <a:solidFill>
+                    <a:srgbClr val="70AD47">
+                      <a:tint val="1000"/>
+                    </a:srgbClr>
+                  </a:solidFill>
+                  <a:effectLst>
+                    <a:glow rad="38100">
+                      <a:schemeClr val="accent1">
+                        <a:alpha val="40000"/>
+                      </a:schemeClr>
+                    </a:glow>
+                    <a:outerShdw blurRad="50800" dist="38100" algn="l" rotWithShape="0">
+                      <a:prstClr val="black">
+                        <a:alpha val="40000"/>
+                      </a:prstClr>
+                    </a:outerShdw>
+                  </a:effectLst>
+                  <a:latin typeface="Kristen ITC" panose="03050502040202030202" pitchFamily="66" charset="0"/>
+                </a:rPr>
+                <a:t>TOMAHAWKS</a:t>
+              </a:r>
+              <a:endParaRPr lang="en-BZ" sz="1200" b="1" cap="none" spc="50" dirty="0">
+                <a:ln w="9525" cmpd="sng">
+                  <a:solidFill>
+                    <a:schemeClr val="accent1"/>
+                  </a:solidFill>
+                  <a:prstDash val="solid"/>
+                </a:ln>
+                <a:solidFill>
+                  <a:srgbClr val="70AD47">
+                    <a:tint val="1000"/>
+                  </a:srgbClr>
+                </a:solidFill>
+                <a:effectLst>
+                  <a:glow rad="38100">
+                    <a:schemeClr val="accent1">
+                      <a:alpha val="40000"/>
+                    </a:schemeClr>
+                  </a:glow>
+                  <a:outerShdw blurRad="50800" dist="38100" algn="l" rotWithShape="0">
+                    <a:prstClr val="black">
+                      <a:alpha val="40000"/>
+                    </a:prstClr>
+                  </a:outerShdw>
+                </a:effectLst>
+              </a:endParaRPr>
+            </a:p>
+          </p:txBody>
+        </p:sp>
+      </p:grpSp>
+      <p:pic>
+        <p:nvPicPr>
+          <p:cNvPr id="2" name="Picture 1">
+            <a:extLst>
+              <a:ext uri="{FF2B5EF4-FFF2-40B4-BE49-F238E27FC236}">
+                <a16:creationId xmlns:a16="http://schemas.microsoft.com/office/drawing/2014/main" id="{DC4EAB61-5233-4D5C-9631-0AA684648012}"/>
+              </a:ext>
+            </a:extLst>
+          </p:cNvPr>
+          <p:cNvPicPr>
+            <a:picLocks noChangeAspect="1"/>
+          </p:cNvPicPr>
+          <p:nvPr/>
+        </p:nvPicPr>
+        <p:blipFill>
+          <a:blip r:embed="rId3"/>
+          <a:stretch>
+            <a:fillRect/>
+          </a:stretch>
+        </p:blipFill>
+        <p:spPr>
+          <a:xfrm>
+            <a:off x="4400833" y="-2"/>
+            <a:ext cx="3379305" cy="1126437"/>
+          </a:xfrm>
+          <a:prstGeom prst="rect">
+            <a:avLst/>
+          </a:prstGeom>
+          <a:solidFill>
+            <a:schemeClr val="tx1"/>
+          </a:solidFill>
+        </p:spPr>
+      </p:pic>
+      <p:sp>
+        <p:nvSpPr>
+          <p:cNvPr id="35" name="Rectangle 34">
+            <a:extLst>
+              <a:ext uri="{FF2B5EF4-FFF2-40B4-BE49-F238E27FC236}">
+                <a16:creationId xmlns:a16="http://schemas.microsoft.com/office/drawing/2014/main" id="{15376281-4841-435D-B070-9F76872E05AB}"/>
+              </a:ext>
+            </a:extLst>
+          </p:cNvPr>
+          <p:cNvSpPr/>
+          <p:nvPr/>
+        </p:nvSpPr>
+        <p:spPr>
+          <a:xfrm>
+            <a:off x="0" y="1014031"/>
+            <a:ext cx="12180972" cy="523222"/>
+          </a:xfrm>
+          <a:prstGeom prst="rect">
+            <a:avLst/>
+          </a:prstGeom>
+          <a:solidFill>
+            <a:schemeClr val="tx1"/>
+          </a:solidFill>
+          <a:ln>
+            <a:solidFill>
+              <a:schemeClr val="tx1"/>
+            </a:solidFill>
+          </a:ln>
+        </p:spPr>
+        <p:style>
+          <a:lnRef idx="2">
+            <a:schemeClr val="accent1">
+              <a:shade val="50000"/>
+            </a:schemeClr>
+          </a:lnRef>
+          <a:fillRef idx="1">
+            <a:schemeClr val="accent1"/>
+          </a:fillRef>
+          <a:effectRef idx="0">
+            <a:schemeClr val="accent1"/>
+          </a:effectRef>
+          <a:fontRef idx="minor">
+            <a:schemeClr val="lt1"/>
+          </a:fontRef>
+        </p:style>
+        <p:txBody>
+          <a:bodyPr rtlCol="0" anchor="ctr"/>
+          <a:lstStyle/>
+          <a:p>
+            <a:pPr algn="ctr"/>
+            <a:endParaRPr lang="en-US"/>
+          </a:p>
+        </p:txBody>
+      </p:sp>
+      <p:sp>
+        <p:nvSpPr>
+          <p:cNvPr id="36" name="Rectangle 35">
+            <a:extLst>
+              <a:ext uri="{FF2B5EF4-FFF2-40B4-BE49-F238E27FC236}">
+                <a16:creationId xmlns:a16="http://schemas.microsoft.com/office/drawing/2014/main" id="{38AC37F4-85DD-44A7-8735-C47520C2F372}"/>
+              </a:ext>
+            </a:extLst>
+          </p:cNvPr>
+          <p:cNvSpPr/>
+          <p:nvPr/>
+        </p:nvSpPr>
+        <p:spPr>
+          <a:xfrm>
+            <a:off x="-1" y="1"/>
+            <a:ext cx="4432308" cy="1131192"/>
+          </a:xfrm>
+          <a:prstGeom prst="rect">
+            <a:avLst/>
+          </a:prstGeom>
+          <a:solidFill>
+            <a:schemeClr val="tx1"/>
+          </a:solidFill>
+          <a:ln>
+            <a:solidFill>
+              <a:schemeClr val="tx1"/>
+            </a:solidFill>
+          </a:ln>
+        </p:spPr>
+        <p:style>
+          <a:lnRef idx="2">
+            <a:schemeClr val="accent1">
+              <a:shade val="50000"/>
+            </a:schemeClr>
+          </a:lnRef>
+          <a:fillRef idx="1">
+            <a:schemeClr val="accent1"/>
+          </a:fillRef>
+          <a:effectRef idx="0">
+            <a:schemeClr val="accent1"/>
+          </a:effectRef>
+          <a:fontRef idx="minor">
+            <a:schemeClr val="lt1"/>
+          </a:fontRef>
+        </p:style>
+        <p:txBody>
+          <a:bodyPr rtlCol="0" anchor="ctr"/>
+          <a:lstStyle/>
+          <a:p>
+            <a:pPr algn="ctr"/>
+            <a:endParaRPr lang="en-US"/>
+          </a:p>
+        </p:txBody>
+      </p:sp>
+      <p:sp>
+        <p:nvSpPr>
+          <p:cNvPr id="37" name="Rectangle 36">
+            <a:extLst>
+              <a:ext uri="{FF2B5EF4-FFF2-40B4-BE49-F238E27FC236}">
+                <a16:creationId xmlns:a16="http://schemas.microsoft.com/office/drawing/2014/main" id="{21739DD9-95B1-4EA8-BA10-AD60C189DC86}"/>
+              </a:ext>
+            </a:extLst>
+          </p:cNvPr>
+          <p:cNvSpPr/>
+          <p:nvPr/>
+        </p:nvSpPr>
+        <p:spPr>
+          <a:xfrm>
+            <a:off x="7780137" y="4420"/>
+            <a:ext cx="4400833" cy="1107727"/>
+          </a:xfrm>
+          <a:prstGeom prst="rect">
+            <a:avLst/>
+          </a:prstGeom>
+          <a:solidFill>
+            <a:schemeClr val="tx1"/>
+          </a:solidFill>
+          <a:ln>
+            <a:solidFill>
+              <a:schemeClr val="tx1"/>
+            </a:solidFill>
+          </a:ln>
+        </p:spPr>
+        <p:style>
+          <a:lnRef idx="2">
+            <a:schemeClr val="accent1">
+              <a:shade val="50000"/>
+            </a:schemeClr>
+          </a:lnRef>
+          <a:fillRef idx="1">
+            <a:schemeClr val="accent1"/>
+          </a:fillRef>
+          <a:effectRef idx="0">
+            <a:schemeClr val="accent1"/>
+          </a:effectRef>
+          <a:fontRef idx="minor">
+            <a:schemeClr val="lt1"/>
+          </a:fontRef>
+        </p:style>
+        <p:txBody>
+          <a:bodyPr rtlCol="0" anchor="ctr"/>
+          <a:lstStyle/>
+          <a:p>
+            <a:pPr algn="ctr"/>
+            <a:endParaRPr lang="en-US"/>
+          </a:p>
+        </p:txBody>
+      </p:sp>
+      <p:sp>
+        <p:nvSpPr>
+          <p:cNvPr id="38" name="Rectangle 37">
+            <a:extLst>
+              <a:ext uri="{FF2B5EF4-FFF2-40B4-BE49-F238E27FC236}">
+                <a16:creationId xmlns:a16="http://schemas.microsoft.com/office/drawing/2014/main" id="{136629E6-8B4B-4F3B-81CF-7BB68773B334}"/>
+              </a:ext>
+            </a:extLst>
+          </p:cNvPr>
+          <p:cNvSpPr/>
+          <p:nvPr/>
+        </p:nvSpPr>
+        <p:spPr>
+          <a:xfrm>
+            <a:off x="-1" y="1537252"/>
+            <a:ext cx="12180972" cy="203286"/>
+          </a:xfrm>
+          <a:prstGeom prst="rect">
+            <a:avLst/>
+          </a:prstGeom>
+          <a:solidFill>
+            <a:schemeClr val="accent6">
+              <a:lumMod val="50000"/>
+            </a:schemeClr>
+          </a:solidFill>
+          <a:ln>
+            <a:solidFill>
+              <a:schemeClr val="accent6">
+                <a:lumMod val="50000"/>
+              </a:schemeClr>
+            </a:solidFill>
+          </a:ln>
+        </p:spPr>
+        <p:style>
+          <a:lnRef idx="2">
+            <a:schemeClr val="accent1">
+              <a:shade val="50000"/>
+            </a:schemeClr>
+          </a:lnRef>
+          <a:fillRef idx="1">
+            <a:schemeClr val="accent1"/>
+          </a:fillRef>
+          <a:effectRef idx="0">
+            <a:schemeClr val="accent1"/>
+          </a:effectRef>
+          <a:fontRef idx="minor">
+            <a:schemeClr val="lt1"/>
+          </a:fontRef>
+        </p:style>
+        <p:txBody>
+          <a:bodyPr rtlCol="0" anchor="ctr"/>
+          <a:lstStyle/>
+          <a:p>
+            <a:pPr algn="ctr"/>
+            <a:endParaRPr lang="en-US"/>
+          </a:p>
+        </p:txBody>
+      </p:sp>
+      <p:sp>
+        <p:nvSpPr>
+          <p:cNvPr id="39" name="TextBox 38">
+            <a:extLst>
+              <a:ext uri="{FF2B5EF4-FFF2-40B4-BE49-F238E27FC236}">
+                <a16:creationId xmlns:a16="http://schemas.microsoft.com/office/drawing/2014/main" id="{33CC85BB-E223-4E1A-847B-DDA92C2AD95B}"/>
+              </a:ext>
+            </a:extLst>
+          </p:cNvPr>
+          <p:cNvSpPr txBox="1"/>
+          <p:nvPr/>
+        </p:nvSpPr>
+        <p:spPr>
+          <a:xfrm>
+            <a:off x="4806342" y="1014032"/>
+            <a:ext cx="2812473" cy="523220"/>
+          </a:xfrm>
+          <a:prstGeom prst="rect">
+            <a:avLst/>
+          </a:prstGeom>
+          <a:noFill/>
+        </p:spPr>
+        <p:txBody>
+          <a:bodyPr wrap="square" rtlCol="0">
+            <a:spAutoFit/>
+          </a:bodyPr>
+          <a:lstStyle/>
+          <a:p>
+            <a:r>
+              <a:rPr lang="en-US" sz="2800" dirty="0">
+                <a:solidFill>
+                  <a:schemeClr val="bg1"/>
+                </a:solidFill>
+                <a:latin typeface="Freestyle Script" panose="030804020302050B0404" pitchFamily="66" charset="0"/>
+              </a:rPr>
+              <a:t>November 2017 Reviews</a:t>
+            </a:r>
+          </a:p>
+        </p:txBody>
+      </p:sp>
+      <p:pic>
+        <p:nvPicPr>
+          <p:cNvPr id="41" name="Picture 40">
+            <a:extLst>
+              <a:ext uri="{FF2B5EF4-FFF2-40B4-BE49-F238E27FC236}">
+                <a16:creationId xmlns:a16="http://schemas.microsoft.com/office/drawing/2014/main" id="{5C778BC8-224A-4BBA-9A70-4B8A70C23CF7}"/>
+              </a:ext>
+            </a:extLst>
+          </p:cNvPr>
+          <p:cNvPicPr>
+            <a:picLocks noChangeAspect="1"/>
+          </p:cNvPicPr>
+          <p:nvPr/>
+        </p:nvPicPr>
+        <p:blipFill>
+          <a:blip r:embed="rId4"/>
+          <a:stretch>
+            <a:fillRect/>
+          </a:stretch>
+        </p:blipFill>
+        <p:spPr>
+          <a:xfrm>
+            <a:off x="7984549" y="66981"/>
+            <a:ext cx="402195" cy="1375622"/>
+          </a:xfrm>
+          <a:prstGeom prst="rect">
+            <a:avLst/>
+          </a:prstGeom>
+        </p:spPr>
+      </p:pic>
+      <p:pic>
+        <p:nvPicPr>
+          <p:cNvPr id="42" name="Picture 41">
+            <a:extLst>
+              <a:ext uri="{FF2B5EF4-FFF2-40B4-BE49-F238E27FC236}">
+                <a16:creationId xmlns:a16="http://schemas.microsoft.com/office/drawing/2014/main" id="{BF0EC3DE-8121-440D-807A-EDBED94633DC}"/>
+              </a:ext>
+            </a:extLst>
+          </p:cNvPr>
+          <p:cNvPicPr>
+            <a:picLocks noChangeAspect="1"/>
+          </p:cNvPicPr>
+          <p:nvPr/>
+        </p:nvPicPr>
+        <p:blipFill>
+          <a:blip r:embed="rId4"/>
+          <a:stretch>
+            <a:fillRect/>
+          </a:stretch>
+        </p:blipFill>
+        <p:spPr>
+          <a:xfrm>
+            <a:off x="3795883" y="66981"/>
+            <a:ext cx="402195" cy="1375622"/>
+          </a:xfrm>
+          <a:prstGeom prst="rect">
+            <a:avLst/>
+          </a:prstGeom>
+        </p:spPr>
+      </p:pic>
+      <p:sp>
+        <p:nvSpPr>
+          <p:cNvPr id="52" name="TextBox 51">
+            <a:extLst>
+              <a:ext uri="{FF2B5EF4-FFF2-40B4-BE49-F238E27FC236}">
+                <a16:creationId xmlns:a16="http://schemas.microsoft.com/office/drawing/2014/main" id="{18E6C686-E61D-48AE-9D2C-A8BBC3EDD9C9}"/>
+              </a:ext>
+            </a:extLst>
+          </p:cNvPr>
+          <p:cNvSpPr txBox="1"/>
+          <p:nvPr/>
+        </p:nvSpPr>
+        <p:spPr>
+          <a:xfrm>
+            <a:off x="101600" y="5843969"/>
+            <a:ext cx="999285" cy="276999"/>
+          </a:xfrm>
+          <a:prstGeom prst="rect">
+            <a:avLst/>
+          </a:prstGeom>
+          <a:noFill/>
+        </p:spPr>
+        <p:txBody>
+          <a:bodyPr wrap="square" rtlCol="0">
+            <a:spAutoFit/>
+          </a:bodyPr>
+          <a:lstStyle/>
+          <a:p>
+            <a:r>
+              <a:rPr lang="en-US" sz="1200" b="1" dirty="0"/>
+              <a:t>Data Source:</a:t>
+            </a:r>
+          </a:p>
+        </p:txBody>
+      </p:sp>
+      <p:sp>
+        <p:nvSpPr>
+          <p:cNvPr id="53" name="TextBox 52">
+            <a:extLst>
+              <a:ext uri="{FF2B5EF4-FFF2-40B4-BE49-F238E27FC236}">
+                <a16:creationId xmlns:a16="http://schemas.microsoft.com/office/drawing/2014/main" id="{5B07C522-8C2B-4904-816C-1507D04C4E1B}"/>
+              </a:ext>
+            </a:extLst>
+          </p:cNvPr>
+          <p:cNvSpPr txBox="1"/>
+          <p:nvPr/>
+        </p:nvSpPr>
+        <p:spPr>
+          <a:xfrm>
+            <a:off x="101600" y="6044426"/>
+            <a:ext cx="1433406" cy="646331"/>
+          </a:xfrm>
+          <a:prstGeom prst="rect">
+            <a:avLst/>
+          </a:prstGeom>
+          <a:noFill/>
+        </p:spPr>
+        <p:txBody>
+          <a:bodyPr wrap="square" rtlCol="0">
+            <a:spAutoFit/>
+          </a:bodyPr>
+          <a:lstStyle/>
+          <a:p>
+            <a:r>
+              <a:rPr lang="en-US" sz="900" dirty="0">
+                <a:hlinkClick r:id="rId5"/>
+              </a:rPr>
+              <a:t>https://www.kaggle.com/zynicide/wine-reviews</a:t>
+            </a:r>
+            <a:endParaRPr lang="en-US" sz="900" dirty="0"/>
+          </a:p>
+          <a:p>
+            <a:endParaRPr lang="en-US" sz="900" dirty="0"/>
+          </a:p>
+          <a:p>
+            <a:r>
+              <a:rPr lang="en-US" sz="900" dirty="0"/>
+              <a:t>129,970 Wines Reviewed</a:t>
+            </a:r>
+          </a:p>
+        </p:txBody>
+      </p:sp>
+      <p:pic>
+        <p:nvPicPr>
+          <p:cNvPr id="3" name="Picture 2">
+            <a:extLst>
+              <a:ext uri="{FF2B5EF4-FFF2-40B4-BE49-F238E27FC236}">
+                <a16:creationId xmlns:a16="http://schemas.microsoft.com/office/drawing/2014/main" id="{8B01C861-9D85-4B6B-81CC-29DCE932F24A}"/>
+              </a:ext>
+            </a:extLst>
+          </p:cNvPr>
+          <p:cNvPicPr>
+            <a:picLocks noChangeAspect="1"/>
+          </p:cNvPicPr>
+          <p:nvPr/>
+        </p:nvPicPr>
+        <p:blipFill>
+          <a:blip r:embed="rId6"/>
+          <a:stretch>
+            <a:fillRect/>
+          </a:stretch>
+        </p:blipFill>
+        <p:spPr>
+          <a:xfrm>
+            <a:off x="1275688" y="1537252"/>
+            <a:ext cx="9744075" cy="4512026"/>
+          </a:xfrm>
+          <a:prstGeom prst="rect">
+            <a:avLst/>
+          </a:prstGeom>
+        </p:spPr>
+      </p:pic>
+    </p:spTree>
+    <p:extLst>
+      <p:ext uri="{BB962C8B-B14F-4D97-AF65-F5344CB8AC3E}">
+        <p14:creationId xmlns:p14="http://schemas.microsoft.com/office/powerpoint/2010/main" val="3686492844"/>
+      </p:ext>
+    </p:extLst>
+  </p:cSld>
+  <p:clrMapOvr>
+    <a:masterClrMapping/>
+  </p:clrMapOvr>
+</p:sld>
+</file>
+
 <file path=ppt/theme/theme1.xml><?xml version="1.0" encoding="utf-8"?>
 <a:theme xmlns:a="http://schemas.openxmlformats.org/drawingml/2006/main" name="Office Theme">
   <a:themeElements>

</xml_diff>